<commit_message>
Small bug fixed. Added demo videos.
</commit_message>
<xml_diff>
--- a/Documents/ppt and video/Bachelor Degree Management.pptx
+++ b/Documents/ppt and video/Bachelor Degree Management.pptx
@@ -6,15 +6,11 @@
   </p:sldMasterIdLst>
   <p:sldIdLst>
     <p:sldId id="256" r:id="rId2"/>
-    <p:sldId id="262" r:id="rId3"/>
-    <p:sldId id="263" r:id="rId4"/>
-    <p:sldId id="257" r:id="rId5"/>
-    <p:sldId id="258" r:id="rId6"/>
-    <p:sldId id="259" r:id="rId7"/>
-    <p:sldId id="260" r:id="rId8"/>
-    <p:sldId id="261" r:id="rId9"/>
-    <p:sldId id="265" r:id="rId10"/>
-    <p:sldId id="264" r:id="rId11"/>
+    <p:sldId id="263" r:id="rId3"/>
+    <p:sldId id="257" r:id="rId4"/>
+    <p:sldId id="258" r:id="rId5"/>
+    <p:sldId id="265" r:id="rId6"/>
+    <p:sldId id="264" r:id="rId7"/>
   </p:sldIdLst>
   <p:sldSz cx="12192000" cy="6858000"/>
   <p:notesSz cx="6858000" cy="9144000"/>
@@ -113,6 +109,11 @@
       </a:defRPr>
     </a:lvl9pPr>
   </p:defaultTextStyle>
+  <p:extLst>
+    <p:ext uri="{EFAFB233-063F-42B5-8137-9DF3F51BA10A}">
+      <p15:sldGuideLst xmlns:p15="http://schemas.microsoft.com/office/powerpoint/2012/main"/>
+    </p:ext>
+  </p:extLst>
 </p:presentation>
 </file>
 
@@ -344,7 +345,7 @@
           <a:p>
             <a:fld id="{D13FE72D-D943-412A-B609-F49066CC69D3}" type="datetimeFigureOut">
               <a:rPr lang="en-US" smtClean="0"/>
-              <a:t>23-Jun-18</a:t>
+              <a:t>24-Jun-18</a:t>
             </a:fld>
             <a:endParaRPr lang="en-US"/>
           </a:p>
@@ -552,7 +553,7 @@
           <a:p>
             <a:fld id="{D13FE72D-D943-412A-B609-F49066CC69D3}" type="datetimeFigureOut">
               <a:rPr lang="en-US" smtClean="0"/>
-              <a:t>23-Jun-18</a:t>
+              <a:t>24-Jun-18</a:t>
             </a:fld>
             <a:endParaRPr lang="en-US"/>
           </a:p>
@@ -810,7 +811,7 @@
           <a:p>
             <a:fld id="{D13FE72D-D943-412A-B609-F49066CC69D3}" type="datetimeFigureOut">
               <a:rPr lang="en-US" smtClean="0"/>
-              <a:t>23-Jun-18</a:t>
+              <a:t>24-Jun-18</a:t>
             </a:fld>
             <a:endParaRPr lang="en-US"/>
           </a:p>
@@ -980,7 +981,7 @@
           <a:p>
             <a:fld id="{D13FE72D-D943-412A-B609-F49066CC69D3}" type="datetimeFigureOut">
               <a:rPr lang="en-US" smtClean="0"/>
-              <a:t>23-Jun-18</a:t>
+              <a:t>24-Jun-18</a:t>
             </a:fld>
             <a:endParaRPr lang="en-US"/>
           </a:p>
@@ -1317,7 +1318,7 @@
           <a:p>
             <a:fld id="{D13FE72D-D943-412A-B609-F49066CC69D3}" type="datetimeFigureOut">
               <a:rPr lang="en-US" smtClean="0"/>
-              <a:t>23-Jun-18</a:t>
+              <a:t>24-Jun-18</a:t>
             </a:fld>
             <a:endParaRPr lang="en-US"/>
           </a:p>
@@ -1592,7 +1593,7 @@
           <a:p>
             <a:fld id="{D13FE72D-D943-412A-B609-F49066CC69D3}" type="datetimeFigureOut">
               <a:rPr lang="en-US" smtClean="0"/>
-              <a:t>23-Jun-18</a:t>
+              <a:t>24-Jun-18</a:t>
             </a:fld>
             <a:endParaRPr lang="en-US"/>
           </a:p>
@@ -1971,7 +1972,7 @@
           <a:p>
             <a:fld id="{D13FE72D-D943-412A-B609-F49066CC69D3}" type="datetimeFigureOut">
               <a:rPr lang="en-US" smtClean="0"/>
-              <a:t>23-Jun-18</a:t>
+              <a:t>24-Jun-18</a:t>
             </a:fld>
             <a:endParaRPr lang="en-US"/>
           </a:p>
@@ -2089,7 +2090,7 @@
           <a:p>
             <a:fld id="{D13FE72D-D943-412A-B609-F49066CC69D3}" type="datetimeFigureOut">
               <a:rPr lang="en-US" smtClean="0"/>
-              <a:t>23-Jun-18</a:t>
+              <a:t>24-Jun-18</a:t>
             </a:fld>
             <a:endParaRPr lang="en-US"/>
           </a:p>
@@ -2262,7 +2263,7 @@
           <a:p>
             <a:fld id="{D13FE72D-D943-412A-B609-F49066CC69D3}" type="datetimeFigureOut">
               <a:rPr lang="en-US" smtClean="0"/>
-              <a:t>23-Jun-18</a:t>
+              <a:t>24-Jun-18</a:t>
             </a:fld>
             <a:endParaRPr lang="en-US"/>
           </a:p>
@@ -2618,7 +2619,7 @@
           <a:p>
             <a:fld id="{D13FE72D-D943-412A-B609-F49066CC69D3}" type="datetimeFigureOut">
               <a:rPr lang="en-US" smtClean="0"/>
-              <a:t>23-Jun-18</a:t>
+              <a:t>24-Jun-18</a:t>
             </a:fld>
             <a:endParaRPr lang="en-US"/>
           </a:p>
@@ -2997,7 +2998,7 @@
           <a:p>
             <a:fld id="{D13FE72D-D943-412A-B609-F49066CC69D3}" type="datetimeFigureOut">
               <a:rPr lang="en-US" smtClean="0"/>
-              <a:t>23-Jun-18</a:t>
+              <a:t>24-Jun-18</a:t>
             </a:fld>
             <a:endParaRPr lang="en-US"/>
           </a:p>
@@ -3286,7 +3287,7 @@
           <a:p>
             <a:fld id="{D13FE72D-D943-412A-B609-F49066CC69D3}" type="datetimeFigureOut">
               <a:rPr lang="en-US" smtClean="0"/>
-              <a:t>23-Jun-18</a:t>
+              <a:t>24-Jun-18</a:t>
             </a:fld>
             <a:endParaRPr lang="en-US"/>
           </a:p>
@@ -3882,13 +3883,7 @@
               <a:rPr lang="ro-RO" sz="2400" dirty="0" smtClean="0">
                 <a:latin typeface="+mj-lt"/>
               </a:rPr>
-              <a:t>Student</a:t>
-            </a:r>
-            <a:r>
-              <a:rPr lang="ro-RO" sz="2400" dirty="0">
-                <a:latin typeface="+mj-lt"/>
-              </a:rPr>
-              <a:t>: </a:t>
+              <a:t>Autor: </a:t>
             </a:r>
             <a:r>
               <a:rPr lang="ro-RO" sz="2400" dirty="0" smtClean="0">
@@ -3902,16 +3897,22 @@
           </a:p>
           <a:p>
             <a:r>
+              <a:rPr lang="ro-RO" sz="2400" dirty="0">
+                <a:latin typeface="+mj-lt"/>
+              </a:rPr>
+              <a:t>C</a:t>
+            </a:r>
+            <a:r>
               <a:rPr lang="ro-RO" sz="2400" dirty="0" smtClean="0">
                 <a:latin typeface="+mj-lt"/>
               </a:rPr>
-              <a:t>Profesor </a:t>
+              <a:t>oordonator</a:t>
             </a:r>
             <a:r>
               <a:rPr lang="ro-RO" sz="2400" dirty="0">
                 <a:latin typeface="+mj-lt"/>
               </a:rPr>
-              <a:t>coordonator: C</a:t>
+              <a:t>: C</a:t>
             </a:r>
             <a:r>
               <a:rPr lang="ro-RO" sz="2400" dirty="0" smtClean="0">
@@ -3946,112 +3947,6 @@
     <p:extLst>
       <p:ext uri="{BB962C8B-B14F-4D97-AF65-F5344CB8AC3E}">
         <p14:creationId xmlns:p14="http://schemas.microsoft.com/office/powerpoint/2010/main" val="1286313236"/>
-      </p:ext>
-    </p:extLst>
-  </p:cSld>
-  <p:clrMapOvr>
-    <a:masterClrMapping/>
-  </p:clrMapOvr>
-  <p:timing>
-    <p:tnLst>
-      <p:par>
-        <p:cTn id="1" dur="indefinite" restart="never" nodeType="tmRoot"/>
-      </p:par>
-    </p:tnLst>
-  </p:timing>
-</p:sld>
-</file>
-
-<file path=ppt/slides/slide10.xml><?xml version="1.0" encoding="utf-8"?>
-<p:sld xmlns:a="http://schemas.openxmlformats.org/drawingml/2006/main" xmlns:r="http://schemas.openxmlformats.org/officeDocument/2006/relationships" xmlns:p="http://schemas.openxmlformats.org/presentationml/2006/main">
-  <p:cSld>
-    <p:spTree>
-      <p:nvGrpSpPr>
-        <p:cNvPr id="1" name=""/>
-        <p:cNvGrpSpPr/>
-        <p:nvPr/>
-      </p:nvGrpSpPr>
-      <p:grpSpPr>
-        <a:xfrm>
-          <a:off x="0" y="0"/>
-          <a:ext cx="0" cy="0"/>
-          <a:chOff x="0" y="0"/>
-          <a:chExt cx="0" cy="0"/>
-        </a:xfrm>
-      </p:grpSpPr>
-      <p:sp>
-        <p:nvSpPr>
-          <p:cNvPr id="2" name="Title 1"/>
-          <p:cNvSpPr>
-            <a:spLocks noGrp="1"/>
-          </p:cNvSpPr>
-          <p:nvPr>
-            <p:ph type="title"/>
-          </p:nvPr>
-        </p:nvSpPr>
-        <p:spPr/>
-        <p:txBody>
-          <a:bodyPr/>
-          <a:lstStyle/>
-          <a:p>
-            <a:r>
-              <a:rPr lang="ro-RO" dirty="0" smtClean="0"/>
-              <a:t>5. Concluzii</a:t>
-            </a:r>
-            <a:endParaRPr lang="en-US" dirty="0"/>
-          </a:p>
-        </p:txBody>
-      </p:sp>
-      <p:sp>
-        <p:nvSpPr>
-          <p:cNvPr id="3" name="Content Placeholder 2"/>
-          <p:cNvSpPr>
-            <a:spLocks noGrp="1"/>
-          </p:cNvSpPr>
-          <p:nvPr>
-            <p:ph idx="1"/>
-          </p:nvPr>
-        </p:nvSpPr>
-        <p:spPr/>
-        <p:txBody>
-          <a:bodyPr/>
-          <a:lstStyle/>
-          <a:p>
-            <a:endParaRPr lang="ro-RO" dirty="0" smtClean="0"/>
-          </a:p>
-          <a:p>
-            <a:r>
-              <a:rPr lang="ro-RO" dirty="0" smtClean="0">
-                <a:latin typeface="+mj-lt"/>
-              </a:rPr>
-              <a:t>Tehnologii noi</a:t>
-            </a:r>
-          </a:p>
-          <a:p>
-            <a:r>
-              <a:rPr lang="ro-RO" dirty="0" smtClean="0">
-                <a:latin typeface="+mj-lt"/>
-              </a:rPr>
-              <a:t>Muncă ce poate fi continuată</a:t>
-            </a:r>
-          </a:p>
-          <a:p>
-            <a:r>
-              <a:rPr lang="ro-RO" dirty="0" smtClean="0">
-                <a:latin typeface="+mj-lt"/>
-              </a:rPr>
-              <a:t>Aplicație utilă</a:t>
-            </a:r>
-            <a:endParaRPr lang="en-US" dirty="0">
-              <a:latin typeface="+mj-lt"/>
-            </a:endParaRPr>
-          </a:p>
-        </p:txBody>
-      </p:sp>
-    </p:spTree>
-    <p:extLst>
-      <p:ext uri="{BB962C8B-B14F-4D97-AF65-F5344CB8AC3E}">
-        <p14:creationId xmlns:p14="http://schemas.microsoft.com/office/powerpoint/2010/main" val="1915096107"/>
       </p:ext>
     </p:extLst>
   </p:cSld>
@@ -4102,7 +3997,7 @@
           <a:p>
             <a:r>
               <a:rPr lang="ro-RO" dirty="0" smtClean="0"/>
-              <a:t>Cuprins		</a:t>
+              <a:t>Motivație</a:t>
             </a:r>
             <a:endParaRPr lang="en-US" dirty="0"/>
           </a:p>
@@ -4118,81 +4013,157 @@
             <p:ph idx="1"/>
           </p:nvPr>
         </p:nvSpPr>
-        <p:spPr/>
-        <p:txBody>
-          <a:bodyPr/>
-          <a:lstStyle/>
-          <a:p>
-            <a:endParaRPr lang="ro-RO" dirty="0" smtClean="0">
+        <p:spPr>
+          <a:xfrm>
+            <a:off x="1097280" y="1737360"/>
+            <a:ext cx="11517745" cy="4023360"/>
+          </a:xfrm>
+        </p:spPr>
+        <p:txBody>
+          <a:bodyPr>
+            <a:normAutofit/>
+          </a:bodyPr>
+          <a:lstStyle/>
+          <a:p>
+            <a:pPr marL="0" indent="0">
+              <a:buNone/>
+            </a:pPr>
+            <a:endParaRPr lang="ro-RO" dirty="0"/>
+          </a:p>
+          <a:p>
+            <a:pPr algn="just">
+              <a:lnSpc>
+                <a:spcPct val="150000"/>
+              </a:lnSpc>
+              <a:buFont typeface="Courier New" panose="02070309020205020404" pitchFamily="49" charset="0"/>
+              <a:buChar char="o"/>
+            </a:pPr>
+            <a:r>
+              <a:rPr lang="ro-RO" sz="2200" dirty="0" smtClean="0">
+                <a:latin typeface="+mj-lt"/>
+              </a:rPr>
+              <a:t> </a:t>
+            </a:r>
+            <a:r>
+              <a:rPr lang="ro-RO" sz="2200" dirty="0" smtClean="0">
+                <a:latin typeface="+mj-lt"/>
+              </a:rPr>
+              <a:t>Lucrarea de licență marchează </a:t>
+            </a:r>
+            <a:r>
+              <a:rPr lang="ro-RO" sz="2200" b="1" dirty="0" smtClean="0">
+                <a:latin typeface="+mj-lt"/>
+              </a:rPr>
+              <a:t>finalizarea studiilor de licență</a:t>
+            </a:r>
+          </a:p>
+          <a:p>
+            <a:pPr algn="just">
+              <a:lnSpc>
+                <a:spcPct val="150000"/>
+              </a:lnSpc>
+              <a:buFont typeface="Courier New" panose="02070309020205020404" pitchFamily="49" charset="0"/>
+              <a:buChar char="o"/>
+            </a:pPr>
+            <a:r>
+              <a:rPr lang="ro-RO" sz="2200" dirty="0" smtClean="0">
+                <a:latin typeface="+mj-lt"/>
+              </a:rPr>
+              <a:t> Procesul elaborării lucrării se întinde pe o </a:t>
+            </a:r>
+            <a:r>
+              <a:rPr lang="ro-RO" sz="2200" b="1" dirty="0" smtClean="0">
+                <a:latin typeface="+mj-lt"/>
+              </a:rPr>
+              <a:t>perioadă lungă de timp</a:t>
+            </a:r>
+          </a:p>
+          <a:p>
+            <a:pPr algn="just">
+              <a:lnSpc>
+                <a:spcPct val="150000"/>
+              </a:lnSpc>
+              <a:buFont typeface="Courier New" panose="02070309020205020404" pitchFamily="49" charset="0"/>
+              <a:buChar char="o"/>
+            </a:pPr>
+            <a:r>
+              <a:rPr lang="ro-RO" sz="2200" dirty="0" smtClean="0">
+                <a:latin typeface="+mj-lt"/>
+              </a:rPr>
+              <a:t> Procesul necesită multe </a:t>
+            </a:r>
+            <a:r>
+              <a:rPr lang="ro-RO" sz="2200" b="1" dirty="0" smtClean="0">
+                <a:latin typeface="+mj-lt"/>
+              </a:rPr>
+              <a:t>întâlniri</a:t>
+            </a:r>
+            <a:r>
+              <a:rPr lang="ro-RO" sz="2200" dirty="0" smtClean="0">
+                <a:latin typeface="+mj-lt"/>
+              </a:rPr>
+              <a:t> și  mult </a:t>
+            </a:r>
+            <a:r>
+              <a:rPr lang="ro-RO" sz="2200" b="1" dirty="0" smtClean="0">
+                <a:latin typeface="+mj-lt"/>
+              </a:rPr>
+              <a:t>timp</a:t>
+            </a:r>
+            <a:r>
+              <a:rPr lang="ro-RO" sz="2200" dirty="0" smtClean="0">
+                <a:latin typeface="+mj-lt"/>
+              </a:rPr>
+              <a:t> din partea ambelor părți implicate</a:t>
+            </a:r>
+          </a:p>
+          <a:p>
+            <a:pPr algn="just">
+              <a:lnSpc>
+                <a:spcPct val="150000"/>
+              </a:lnSpc>
+              <a:buFont typeface="Courier New" panose="02070309020205020404" pitchFamily="49" charset="0"/>
+              <a:buChar char="o"/>
+            </a:pPr>
+            <a:r>
+              <a:rPr lang="ro-RO" sz="2200" dirty="0" smtClean="0">
+                <a:latin typeface="+mj-lt"/>
+              </a:rPr>
+              <a:t> Modul de viață curent nu permite întotdeauna </a:t>
+            </a:r>
+            <a:r>
+              <a:rPr lang="ro-RO" sz="2200" b="1" dirty="0" smtClean="0">
+                <a:latin typeface="+mj-lt"/>
+              </a:rPr>
+              <a:t>disponibilitate maximă </a:t>
+            </a:r>
+            <a:r>
+              <a:rPr lang="ro-RO" sz="2200" dirty="0" smtClean="0">
+                <a:latin typeface="+mj-lt"/>
+              </a:rPr>
+              <a:t>a resurselor necesare</a:t>
+            </a:r>
+            <a:endParaRPr lang="ro-RO" sz="2200" dirty="0" smtClean="0">
               <a:latin typeface="+mj-lt"/>
             </a:endParaRPr>
           </a:p>
           <a:p>
-            <a:pPr marL="457200" indent="-457200">
-              <a:buFont typeface="+mj-lt"/>
-              <a:buAutoNum type="arabicPeriod"/>
-            </a:pPr>
             <a:r>
               <a:rPr lang="ro-RO" dirty="0" smtClean="0">
                 <a:latin typeface="+mj-lt"/>
               </a:rPr>
-              <a:t>Motivație </a:t>
-            </a:r>
-          </a:p>
-          <a:p>
-            <a:pPr marL="457200" indent="-457200">
-              <a:buFont typeface="+mj-lt"/>
-              <a:buAutoNum type="arabicPeriod"/>
-            </a:pPr>
-            <a:r>
-              <a:rPr lang="ro-RO" dirty="0" smtClean="0">
-                <a:latin typeface="+mj-lt"/>
-              </a:rPr>
-              <a:t>Descrierea aplicației</a:t>
-            </a:r>
-          </a:p>
-          <a:p>
-            <a:pPr marL="457200" indent="-457200">
-              <a:buFont typeface="+mj-lt"/>
-              <a:buAutoNum type="arabicPeriod"/>
-            </a:pPr>
-            <a:r>
-              <a:rPr lang="ro-RO" dirty="0" smtClean="0">
-                <a:latin typeface="+mj-lt"/>
-              </a:rPr>
-              <a:t>Arhitectură</a:t>
-            </a:r>
-          </a:p>
-          <a:p>
-            <a:pPr marL="457200" indent="-457200">
-              <a:buFont typeface="+mj-lt"/>
-              <a:buAutoNum type="arabicPeriod"/>
-            </a:pPr>
-            <a:r>
-              <a:rPr lang="ro-RO" dirty="0" smtClean="0">
-                <a:latin typeface="+mj-lt"/>
-              </a:rPr>
-              <a:t>Direcții viitoare</a:t>
-            </a:r>
-          </a:p>
-          <a:p>
-            <a:pPr marL="457200" indent="-457200">
-              <a:buFont typeface="+mj-lt"/>
-              <a:buAutoNum type="arabicPeriod"/>
-            </a:pPr>
-            <a:r>
-              <a:rPr lang="ro-RO" dirty="0" smtClean="0">
-                <a:latin typeface="+mj-lt"/>
-              </a:rPr>
-              <a:t>Concluzii</a:t>
-            </a:r>
+              <a:t> </a:t>
+            </a:r>
+            <a:endParaRPr lang="en-US" dirty="0">
+              <a:latin typeface="+mj-lt"/>
+            </a:endParaRPr>
           </a:p>
         </p:txBody>
       </p:sp>
     </p:spTree>
     <p:extLst>
       <p:ext uri="{BB962C8B-B14F-4D97-AF65-F5344CB8AC3E}">
-        <p14:creationId xmlns:p14="http://schemas.microsoft.com/office/powerpoint/2010/main" val="1441325303"/>
+        <p14:creationId xmlns:p14="http://schemas.microsoft.com/office/powerpoint/2010/main" val="3420904227"/>
       </p:ext>
     </p:extLst>
   </p:cSld>
@@ -4243,7 +4214,11 @@
           <a:p>
             <a:r>
               <a:rPr lang="ro-RO" dirty="0" smtClean="0"/>
-              <a:t>1. Motivație</a:t>
+              <a:t>Descrierea </a:t>
+            </a:r>
+            <a:r>
+              <a:rPr lang="ro-RO" dirty="0" smtClean="0"/>
+              <a:t>aplicației	</a:t>
             </a:r>
             <a:endParaRPr lang="en-US" dirty="0"/>
           </a:p>
@@ -4259,20 +4234,435 @@
             <p:ph idx="1"/>
           </p:nvPr>
         </p:nvSpPr>
-        <p:spPr/>
-        <p:txBody>
-          <a:bodyPr/>
-          <a:lstStyle/>
-          <a:p>
-            <a:endParaRPr lang="ro-RO" dirty="0" smtClean="0"/>
-          </a:p>
-          <a:p>
+        <p:spPr>
+          <a:xfrm>
+            <a:off x="1097280" y="1845733"/>
+            <a:ext cx="10058400" cy="4481175"/>
+          </a:xfrm>
+        </p:spPr>
+        <p:txBody>
+          <a:bodyPr>
+            <a:normAutofit fontScale="77500" lnSpcReduction="20000"/>
+          </a:bodyPr>
+          <a:lstStyle/>
+          <a:p>
+            <a:pPr>
+              <a:buFont typeface="Courier New" panose="02070309020205020404" pitchFamily="49" charset="0"/>
+              <a:buChar char="o"/>
+            </a:pPr>
+            <a:r>
+              <a:rPr lang="ro-RO" b="1" dirty="0">
+                <a:latin typeface="+mj-lt"/>
+              </a:rPr>
+              <a:t> </a:t>
+            </a:r>
+            <a:r>
+              <a:rPr lang="ro-RO" sz="2400" b="1" dirty="0" smtClean="0">
+                <a:latin typeface="+mj-lt"/>
+              </a:rPr>
+              <a:t>Student</a:t>
+            </a:r>
+            <a:endParaRPr lang="ro-RO" sz="2000" dirty="0" smtClean="0">
+              <a:latin typeface="+mj-lt"/>
+            </a:endParaRPr>
+          </a:p>
+          <a:p>
+            <a:pPr lvl="3">
+              <a:buFont typeface="Arial" panose="020B0604020202020204" pitchFamily="34" charset="0"/>
+              <a:buChar char="•"/>
+            </a:pPr>
+            <a:r>
+              <a:rPr lang="ro-RO" sz="1900" dirty="0" smtClean="0">
+                <a:latin typeface="+mj-lt"/>
+              </a:rPr>
+              <a:t>are </a:t>
+            </a:r>
+            <a:r>
+              <a:rPr lang="ro-RO" sz="1900" b="1" dirty="0" smtClean="0">
+                <a:latin typeface="+mj-lt"/>
+              </a:rPr>
+              <a:t>acces</a:t>
+            </a:r>
+            <a:r>
+              <a:rPr lang="ro-RO" sz="1900" dirty="0" smtClean="0">
+                <a:latin typeface="+mj-lt"/>
+              </a:rPr>
+              <a:t> la toți coordonatorii existenți în sistem, până la stabilirea coordonatorului său</a:t>
+            </a:r>
+          </a:p>
+          <a:p>
+            <a:pPr lvl="3">
+              <a:buFont typeface="Arial" panose="020B0604020202020204" pitchFamily="34" charset="0"/>
+              <a:buChar char="•"/>
+            </a:pPr>
+            <a:r>
+              <a:rPr lang="ro-RO" sz="1900" dirty="0" smtClean="0">
+                <a:latin typeface="+mj-lt"/>
+              </a:rPr>
+              <a:t>are </a:t>
+            </a:r>
+            <a:r>
+              <a:rPr lang="ro-RO" sz="1900" b="1" dirty="0" smtClean="0">
+                <a:latin typeface="+mj-lt"/>
+              </a:rPr>
+              <a:t>acces</a:t>
+            </a:r>
+            <a:r>
+              <a:rPr lang="ro-RO" sz="1900" dirty="0" smtClean="0">
+                <a:latin typeface="+mj-lt"/>
+              </a:rPr>
+              <a:t> la lucrările tuturor studenților cu care are în comun coordonatorul</a:t>
+            </a:r>
+          </a:p>
+          <a:p>
+            <a:pPr lvl="3">
+              <a:buFont typeface="Arial" panose="020B0604020202020204" pitchFamily="34" charset="0"/>
+              <a:buChar char="•"/>
+            </a:pPr>
+            <a:r>
+              <a:rPr lang="ro-RO" sz="1900" dirty="0" smtClean="0">
+                <a:latin typeface="+mj-lt"/>
+              </a:rPr>
+              <a:t>are </a:t>
+            </a:r>
+            <a:r>
+              <a:rPr lang="ro-RO" sz="1900" dirty="0" smtClean="0">
+                <a:latin typeface="+mj-lt"/>
+              </a:rPr>
+              <a:t>posibilitatea </a:t>
+            </a:r>
+            <a:r>
+              <a:rPr lang="ro-RO" sz="1900" b="1" dirty="0" smtClean="0">
+                <a:latin typeface="+mj-lt"/>
+              </a:rPr>
+              <a:t>postării</a:t>
+            </a:r>
+            <a:r>
+              <a:rPr lang="ro-RO" sz="1900" dirty="0" smtClean="0">
+                <a:latin typeface="+mj-lt"/>
+              </a:rPr>
+              <a:t> de </a:t>
+            </a:r>
+            <a:r>
+              <a:rPr lang="ro-RO" sz="1900" b="1" dirty="0" smtClean="0">
+                <a:latin typeface="+mj-lt"/>
+              </a:rPr>
+              <a:t>întrebări</a:t>
+            </a:r>
+            <a:r>
+              <a:rPr lang="ro-RO" sz="1900" dirty="0" smtClean="0">
+                <a:latin typeface="+mj-lt"/>
+              </a:rPr>
+              <a:t> și/sau chiar </a:t>
+            </a:r>
+            <a:r>
+              <a:rPr lang="ro-RO" sz="1900" b="1" dirty="0" smtClean="0">
+                <a:latin typeface="+mj-lt"/>
+              </a:rPr>
+              <a:t>răspunsuri </a:t>
+            </a:r>
+          </a:p>
+          <a:p>
+            <a:pPr lvl="3">
+              <a:buFont typeface="Arial" panose="020B0604020202020204" pitchFamily="34" charset="0"/>
+              <a:buChar char="•"/>
+            </a:pPr>
+            <a:r>
+              <a:rPr lang="ro-RO" sz="1900" dirty="0" smtClean="0">
+                <a:latin typeface="+mj-lt"/>
+              </a:rPr>
+              <a:t>are </a:t>
+            </a:r>
+            <a:r>
+              <a:rPr lang="ro-RO" sz="1900" b="1" dirty="0" smtClean="0">
+                <a:latin typeface="+mj-lt"/>
+              </a:rPr>
+              <a:t>singura responsabilitate </a:t>
+            </a:r>
+            <a:r>
+              <a:rPr lang="ro-RO" sz="1900" dirty="0" smtClean="0">
+                <a:latin typeface="+mj-lt"/>
+              </a:rPr>
+              <a:t>de a menține codul sursă acutalizat într-un sistem de versionare</a:t>
+            </a:r>
+          </a:p>
+          <a:p>
+            <a:pPr marL="566928" lvl="3" indent="0">
+              <a:buNone/>
+            </a:pPr>
+            <a:endParaRPr lang="ro-RO" sz="1900" dirty="0" smtClean="0">
+              <a:latin typeface="+mj-lt"/>
+            </a:endParaRPr>
+          </a:p>
+          <a:p>
+            <a:pPr>
+              <a:buFont typeface="Courier New" panose="02070309020205020404" pitchFamily="49" charset="0"/>
+              <a:buChar char="o"/>
+            </a:pPr>
+            <a:r>
+              <a:rPr lang="ro-RO" sz="2400" dirty="0">
+                <a:latin typeface="+mj-lt"/>
+              </a:rPr>
+              <a:t> </a:t>
+            </a:r>
+            <a:r>
+              <a:rPr lang="ro-RO" sz="2400" b="1" dirty="0" smtClean="0">
+                <a:latin typeface="+mj-lt"/>
+              </a:rPr>
+              <a:t>Profesor coordonator</a:t>
+            </a:r>
+            <a:endParaRPr lang="ro-RO" sz="2400" b="1" dirty="0" smtClean="0">
+              <a:latin typeface="+mj-lt"/>
+            </a:endParaRPr>
+          </a:p>
+          <a:p>
+            <a:pPr lvl="3">
+              <a:buFont typeface="Arial" panose="020B0604020202020204" pitchFamily="34" charset="0"/>
+              <a:buChar char="•"/>
+            </a:pPr>
+            <a:r>
+              <a:rPr lang="ro-RO" sz="1900" dirty="0" smtClean="0">
+                <a:latin typeface="+mj-lt"/>
+              </a:rPr>
+              <a:t>are </a:t>
+            </a:r>
+            <a:r>
+              <a:rPr lang="ro-RO" sz="1900" b="1" dirty="0" smtClean="0">
+                <a:latin typeface="+mj-lt"/>
+              </a:rPr>
+              <a:t>acces</a:t>
+            </a:r>
+            <a:r>
+              <a:rPr lang="ro-RO" sz="1900" dirty="0" smtClean="0">
+                <a:latin typeface="+mj-lt"/>
+              </a:rPr>
+              <a:t> la cererile tuturor studenților, pe care le acceptă sau aprobă</a:t>
+            </a:r>
+          </a:p>
+          <a:p>
+            <a:pPr lvl="3">
+              <a:buFont typeface="Arial" panose="020B0604020202020204" pitchFamily="34" charset="0"/>
+              <a:buChar char="•"/>
+            </a:pPr>
+            <a:r>
+              <a:rPr lang="ro-RO" sz="1900" dirty="0" smtClean="0">
+                <a:latin typeface="+mj-lt"/>
+              </a:rPr>
+              <a:t>are </a:t>
+            </a:r>
+            <a:r>
+              <a:rPr lang="ro-RO" sz="1900" b="1" dirty="0" smtClean="0">
+                <a:latin typeface="+mj-lt"/>
+              </a:rPr>
+              <a:t>posibilitatea</a:t>
+            </a:r>
+            <a:r>
+              <a:rPr lang="ro-RO" sz="1900" dirty="0" smtClean="0">
+                <a:latin typeface="+mj-lt"/>
+              </a:rPr>
+              <a:t> de a adăuga o </a:t>
+            </a:r>
+            <a:r>
+              <a:rPr lang="ro-RO" sz="1900" b="1" dirty="0" smtClean="0">
+                <a:latin typeface="+mj-lt"/>
+              </a:rPr>
+              <a:t>propunere</a:t>
+            </a:r>
+            <a:r>
+              <a:rPr lang="ro-RO" sz="1900" dirty="0" smtClean="0">
+                <a:latin typeface="+mj-lt"/>
+              </a:rPr>
+              <a:t> de temă el însuși</a:t>
+            </a:r>
+          </a:p>
+          <a:p>
+            <a:pPr lvl="3">
+              <a:buFont typeface="Arial" panose="020B0604020202020204" pitchFamily="34" charset="0"/>
+              <a:buChar char="•"/>
+            </a:pPr>
+            <a:r>
+              <a:rPr lang="ro-RO" sz="1900" dirty="0" smtClean="0">
+                <a:latin typeface="+mj-lt"/>
+              </a:rPr>
+              <a:t>are la dispoziție un </a:t>
+            </a:r>
+            <a:r>
+              <a:rPr lang="ro-RO" sz="1900" b="1" dirty="0" smtClean="0">
+                <a:latin typeface="+mj-lt"/>
+              </a:rPr>
+              <a:t>spațiu</a:t>
+            </a:r>
+            <a:r>
+              <a:rPr lang="ro-RO" sz="1900" dirty="0" smtClean="0">
+                <a:latin typeface="+mj-lt"/>
+              </a:rPr>
+              <a:t> în cadrul căruia poate posta orice fel de </a:t>
+            </a:r>
+            <a:r>
+              <a:rPr lang="ro-RO" sz="1900" b="1" dirty="0" smtClean="0">
+                <a:latin typeface="+mj-lt"/>
+              </a:rPr>
+              <a:t>infomații</a:t>
+            </a:r>
+            <a:r>
+              <a:rPr lang="ro-RO" sz="1900" dirty="0" smtClean="0">
+                <a:latin typeface="+mj-lt"/>
+              </a:rPr>
+              <a:t> dorește</a:t>
+            </a:r>
+          </a:p>
+          <a:p>
+            <a:pPr lvl="3">
+              <a:buFont typeface="Arial" panose="020B0604020202020204" pitchFamily="34" charset="0"/>
+              <a:buChar char="•"/>
+            </a:pPr>
+            <a:r>
+              <a:rPr lang="ro-RO" sz="1900" dirty="0" smtClean="0">
+                <a:latin typeface="+mj-lt"/>
+              </a:rPr>
+              <a:t>are </a:t>
+            </a:r>
+            <a:r>
+              <a:rPr lang="ro-RO" sz="1900" b="1" dirty="0" smtClean="0">
+                <a:latin typeface="+mj-lt"/>
+              </a:rPr>
+              <a:t>acces facil </a:t>
+            </a:r>
+            <a:r>
+              <a:rPr lang="ro-RO" sz="1900" dirty="0" smtClean="0">
+                <a:latin typeface="+mj-lt"/>
+              </a:rPr>
+              <a:t>la lucrările tutror studenților pe care îi coordonează</a:t>
+            </a:r>
+          </a:p>
+          <a:p>
+            <a:pPr lvl="3">
+              <a:buFont typeface="Arial" panose="020B0604020202020204" pitchFamily="34" charset="0"/>
+              <a:buChar char="•"/>
+            </a:pPr>
+            <a:endParaRPr lang="ro-RO" sz="1600" dirty="0">
+              <a:latin typeface="+mj-lt"/>
+            </a:endParaRPr>
+          </a:p>
+          <a:p>
+            <a:pPr marL="251460" indent="-342900">
+              <a:buFont typeface="Courier New" panose="02070309020205020404" pitchFamily="49" charset="0"/>
+              <a:buChar char="o"/>
+            </a:pPr>
+            <a:r>
+              <a:rPr lang="ro-RO" sz="2400" b="1" dirty="0" smtClean="0">
+                <a:latin typeface="+mj-lt"/>
+              </a:rPr>
+              <a:t>Administrator</a:t>
+            </a:r>
+            <a:endParaRPr lang="ro-RO" sz="2200" b="1" dirty="0" smtClean="0">
+              <a:latin typeface="+mj-lt"/>
+            </a:endParaRPr>
+          </a:p>
+          <a:p>
+            <a:pPr lvl="3">
+              <a:buFont typeface="Arial" panose="020B0604020202020204" pitchFamily="34" charset="0"/>
+              <a:buChar char="•"/>
+            </a:pPr>
+            <a:r>
+              <a:rPr lang="ro-RO" sz="1900" b="1" dirty="0">
+                <a:latin typeface="+mj-lt"/>
+              </a:rPr>
+              <a:t> </a:t>
+            </a:r>
+            <a:r>
+              <a:rPr lang="ro-RO" sz="1900" dirty="0" smtClean="0">
+                <a:latin typeface="+mj-lt"/>
+              </a:rPr>
+              <a:t>are posibilitatea de a </a:t>
+            </a:r>
+            <a:r>
+              <a:rPr lang="ro-RO" sz="1900" b="1" dirty="0" smtClean="0">
+                <a:latin typeface="+mj-lt"/>
+              </a:rPr>
+              <a:t>adăuga</a:t>
+            </a:r>
+            <a:r>
+              <a:rPr lang="ro-RO" sz="1900" dirty="0" smtClean="0">
+                <a:latin typeface="+mj-lt"/>
+              </a:rPr>
+              <a:t>, </a:t>
+            </a:r>
+            <a:r>
+              <a:rPr lang="ro-RO" sz="1900" b="1" dirty="0" smtClean="0">
+                <a:latin typeface="+mj-lt"/>
+              </a:rPr>
+              <a:t>șterge</a:t>
+            </a:r>
+            <a:r>
+              <a:rPr lang="ro-RO" sz="1900" dirty="0" smtClean="0">
+                <a:latin typeface="+mj-lt"/>
+              </a:rPr>
+              <a:t> sau </a:t>
+            </a:r>
+            <a:r>
+              <a:rPr lang="ro-RO" sz="1900" b="1" dirty="0" smtClean="0">
+                <a:latin typeface="+mj-lt"/>
+              </a:rPr>
+              <a:t>edita</a:t>
+            </a:r>
+            <a:r>
+              <a:rPr lang="ro-RO" sz="1900" dirty="0" smtClean="0">
+                <a:latin typeface="+mj-lt"/>
+              </a:rPr>
+              <a:t> înregistrările de tip profesor</a:t>
+            </a:r>
+            <a:endParaRPr lang="ro-RO" sz="1900" b="1" dirty="0" smtClean="0">
+              <a:latin typeface="+mj-lt"/>
+            </a:endParaRPr>
+          </a:p>
+          <a:p>
+            <a:pPr lvl="3">
+              <a:buFont typeface="Arial" panose="020B0604020202020204" pitchFamily="34" charset="0"/>
+              <a:buChar char="•"/>
+            </a:pPr>
+            <a:endParaRPr lang="ro-RO" sz="1600" dirty="0" smtClean="0">
+              <a:latin typeface="+mj-lt"/>
+            </a:endParaRPr>
+          </a:p>
+          <a:p>
+            <a:pPr marL="566928" lvl="3" indent="0">
+              <a:buNone/>
+            </a:pPr>
+            <a:endParaRPr lang="ro-RO" sz="1600" dirty="0" smtClean="0">
+              <a:latin typeface="+mj-lt"/>
+            </a:endParaRPr>
+          </a:p>
+          <a:p>
+            <a:pPr lvl="3">
+              <a:buFont typeface="Courier New" panose="02070309020205020404" pitchFamily="49" charset="0"/>
+              <a:buChar char="o"/>
+            </a:pPr>
+            <a:endParaRPr lang="ro-RO" dirty="0" smtClean="0">
+              <a:latin typeface="+mj-lt"/>
+            </a:endParaRPr>
+          </a:p>
+          <a:p>
+            <a:pPr marL="1608560" lvl="8" indent="0">
+              <a:buNone/>
+            </a:pPr>
+            <a:r>
+              <a:rPr lang="ro-RO" dirty="0">
+                <a:latin typeface="+mj-lt"/>
+              </a:rPr>
+              <a:t> </a:t>
+            </a:r>
             <a:r>
               <a:rPr lang="ro-RO" dirty="0" smtClean="0">
                 <a:latin typeface="+mj-lt"/>
               </a:rPr>
-              <a:t>Some text motivating the theme</a:t>
-            </a:r>
+              <a:t>      </a:t>
+            </a:r>
+            <a:endParaRPr lang="ro-RO" dirty="0" smtClean="0">
+              <a:latin typeface="+mj-lt"/>
+            </a:endParaRPr>
+          </a:p>
+          <a:p>
             <a:endParaRPr lang="en-US" dirty="0">
               <a:latin typeface="+mj-lt"/>
             </a:endParaRPr>
@@ -4282,7 +4672,7 @@
     </p:spTree>
     <p:extLst>
       <p:ext uri="{BB962C8B-B14F-4D97-AF65-F5344CB8AC3E}">
-        <p14:creationId xmlns:p14="http://schemas.microsoft.com/office/powerpoint/2010/main" val="3420904227"/>
+        <p14:creationId xmlns:p14="http://schemas.microsoft.com/office/powerpoint/2010/main" val="858921735"/>
       </p:ext>
     </p:extLst>
   </p:cSld>
@@ -4333,7 +4723,11 @@
           <a:p>
             <a:r>
               <a:rPr lang="ro-RO" dirty="0" smtClean="0"/>
-              <a:t>2. Descrierea aplicației	</a:t>
+              <a:t>Descrierea </a:t>
+            </a:r>
+            <a:r>
+              <a:rPr lang="ro-RO" dirty="0" smtClean="0"/>
+              <a:t>aplicației	</a:t>
             </a:r>
             <a:endParaRPr lang="en-US" dirty="0"/>
           </a:p>
@@ -4361,28 +4755,46 @@
               <a:rPr lang="ro-RO" dirty="0" smtClean="0">
                 <a:latin typeface="+mj-lt"/>
               </a:rPr>
-              <a:t>Tipuri de utilizatori</a:t>
-            </a:r>
-          </a:p>
-          <a:p>
-            <a:r>
-              <a:rPr lang="ro-RO" dirty="0" smtClean="0">
-                <a:latin typeface="+mj-lt"/>
-              </a:rPr>
-              <a:t>Obiective generale</a:t>
-            </a:r>
-          </a:p>
-          <a:p>
-            <a:endParaRPr lang="en-US" dirty="0">
+              <a:t>Demo</a:t>
+            </a:r>
+            <a:r>
+              <a:rPr lang="en-US" dirty="0" smtClean="0">
+                <a:latin typeface="+mj-lt"/>
+              </a:rPr>
+              <a:t> student</a:t>
+            </a:r>
+          </a:p>
+          <a:p>
+            <a:r>
+              <a:rPr lang="en-US" dirty="0" smtClean="0">
+                <a:latin typeface="+mj-lt"/>
+              </a:rPr>
+              <a:t>Demo </a:t>
+            </a:r>
+            <a:r>
+              <a:rPr lang="en-US" dirty="0" err="1" smtClean="0">
+                <a:latin typeface="+mj-lt"/>
+              </a:rPr>
+              <a:t>profesor</a:t>
+            </a:r>
+            <a:endParaRPr lang="en-US" dirty="0" smtClean="0">
               <a:latin typeface="+mj-lt"/>
             </a:endParaRPr>
+          </a:p>
+          <a:p>
+            <a:r>
+              <a:rPr lang="en-US" dirty="0" smtClean="0">
+                <a:latin typeface="+mj-lt"/>
+              </a:rPr>
+              <a:t>Demo administrator</a:t>
+            </a:r>
           </a:p>
         </p:txBody>
       </p:sp>
     </p:spTree>
     <p:extLst>
       <p:ext uri="{BB962C8B-B14F-4D97-AF65-F5344CB8AC3E}">
-        <p14:creationId xmlns:p14="http://schemas.microsoft.com/office/powerpoint/2010/main" val="858921735"/>
+        <p14:creationId xmlns:p14="http://schemas.microsoft.com/office/powerpoint/2010/main" val="1582028063"/>
       </p:ext>
     </p:extLst>
   </p:cSld>
@@ -4433,7 +4845,11 @@
           <a:p>
             <a:r>
               <a:rPr lang="ro-RO" dirty="0" smtClean="0"/>
-              <a:t>2. Descrierea aplicației	</a:t>
+              <a:t>Direcții </a:t>
+            </a:r>
+            <a:r>
+              <a:rPr lang="ro-RO" dirty="0" smtClean="0"/>
+              <a:t>viitoare</a:t>
             </a:r>
             <a:endParaRPr lang="en-US" dirty="0"/>
           </a:p>
@@ -4461,46 +4877,18 @@
               <a:rPr lang="ro-RO" dirty="0" smtClean="0">
                 <a:latin typeface="+mj-lt"/>
               </a:rPr>
-              <a:t>Demo</a:t>
-            </a:r>
-            <a:r>
-              <a:rPr lang="en-US" dirty="0" smtClean="0">
-                <a:latin typeface="+mj-lt"/>
-              </a:rPr>
-              <a:t> student</a:t>
-            </a:r>
-          </a:p>
-          <a:p>
-            <a:r>
-              <a:rPr lang="en-US" dirty="0" smtClean="0">
-                <a:latin typeface="+mj-lt"/>
-              </a:rPr>
-              <a:t>Demo </a:t>
-            </a:r>
-            <a:r>
-              <a:rPr lang="en-US" dirty="0" err="1" smtClean="0">
-                <a:latin typeface="+mj-lt"/>
-              </a:rPr>
-              <a:t>profesor</a:t>
-            </a:r>
-            <a:endParaRPr lang="en-US" dirty="0" smtClean="0">
+              <a:t>All kind of upgrades that can be made</a:t>
+            </a:r>
+            <a:endParaRPr lang="en-US" dirty="0">
               <a:latin typeface="+mj-lt"/>
             </a:endParaRPr>
-          </a:p>
-          <a:p>
-            <a:r>
-              <a:rPr lang="en-US" dirty="0" smtClean="0">
-                <a:latin typeface="+mj-lt"/>
-              </a:rPr>
-              <a:t>Demo administrator</a:t>
-            </a:r>
           </a:p>
         </p:txBody>
       </p:sp>
     </p:spTree>
     <p:extLst>
       <p:ext uri="{BB962C8B-B14F-4D97-AF65-F5344CB8AC3E}">
-        <p14:creationId xmlns:p14="http://schemas.microsoft.com/office/powerpoint/2010/main" val="1582028063"/>
+        <p14:creationId xmlns:p14="http://schemas.microsoft.com/office/powerpoint/2010/main" val="3341079738"/>
       </p:ext>
     </p:extLst>
   </p:cSld>
@@ -4551,7 +4939,7 @@
           <a:p>
             <a:r>
               <a:rPr lang="ro-RO" dirty="0" smtClean="0"/>
-              <a:t>3. Arhitectură</a:t>
+              <a:t>Concluzii</a:t>
             </a:r>
             <a:endParaRPr lang="en-US" dirty="0"/>
           </a:p>
@@ -4579,7 +4967,23 @@
               <a:rPr lang="ro-RO" dirty="0" smtClean="0">
                 <a:latin typeface="+mj-lt"/>
               </a:rPr>
-              <a:t>Client server</a:t>
+              <a:t>Tehnologii noi</a:t>
+            </a:r>
+          </a:p>
+          <a:p>
+            <a:r>
+              <a:rPr lang="ro-RO" dirty="0" smtClean="0">
+                <a:latin typeface="+mj-lt"/>
+              </a:rPr>
+              <a:t>Muncă ce poate fi continuată</a:t>
+            </a:r>
+          </a:p>
+          <a:p>
+            <a:r>
+              <a:rPr lang="ro-RO" dirty="0" smtClean="0">
+                <a:latin typeface="+mj-lt"/>
+              </a:rPr>
+              <a:t>Aplicație utilă</a:t>
             </a:r>
             <a:endParaRPr lang="en-US" dirty="0">
               <a:latin typeface="+mj-lt"/>
@@ -4590,299 +4994,7 @@
     </p:spTree>
     <p:extLst>
       <p:ext uri="{BB962C8B-B14F-4D97-AF65-F5344CB8AC3E}">
-        <p14:creationId xmlns:p14="http://schemas.microsoft.com/office/powerpoint/2010/main" val="200930972"/>
-      </p:ext>
-    </p:extLst>
-  </p:cSld>
-  <p:clrMapOvr>
-    <a:masterClrMapping/>
-  </p:clrMapOvr>
-  <p:timing>
-    <p:tnLst>
-      <p:par>
-        <p:cTn id="1" dur="indefinite" restart="never" nodeType="tmRoot"/>
-      </p:par>
-    </p:tnLst>
-  </p:timing>
-</p:sld>
-</file>
-
-<file path=ppt/slides/slide7.xml><?xml version="1.0" encoding="utf-8"?>
-<p:sld xmlns:a="http://schemas.openxmlformats.org/drawingml/2006/main" xmlns:r="http://schemas.openxmlformats.org/officeDocument/2006/relationships" xmlns:p="http://schemas.openxmlformats.org/presentationml/2006/main">
-  <p:cSld>
-    <p:spTree>
-      <p:nvGrpSpPr>
-        <p:cNvPr id="1" name=""/>
-        <p:cNvGrpSpPr/>
-        <p:nvPr/>
-      </p:nvGrpSpPr>
-      <p:grpSpPr>
-        <a:xfrm>
-          <a:off x="0" y="0"/>
-          <a:ext cx="0" cy="0"/>
-          <a:chOff x="0" y="0"/>
-          <a:chExt cx="0" cy="0"/>
-        </a:xfrm>
-      </p:grpSpPr>
-      <p:sp>
-        <p:nvSpPr>
-          <p:cNvPr id="2" name="Title 1"/>
-          <p:cNvSpPr>
-            <a:spLocks noGrp="1"/>
-          </p:cNvSpPr>
-          <p:nvPr>
-            <p:ph type="title"/>
-          </p:nvPr>
-        </p:nvSpPr>
-        <p:spPr/>
-        <p:txBody>
-          <a:bodyPr/>
-          <a:lstStyle/>
-          <a:p>
-            <a:r>
-              <a:rPr lang="ro-RO" dirty="0"/>
-              <a:t>3. Arhitectură</a:t>
-            </a:r>
-            <a:endParaRPr lang="en-US" dirty="0"/>
-          </a:p>
-        </p:txBody>
-      </p:sp>
-      <p:sp>
-        <p:nvSpPr>
-          <p:cNvPr id="3" name="Content Placeholder 2"/>
-          <p:cNvSpPr>
-            <a:spLocks noGrp="1"/>
-          </p:cNvSpPr>
-          <p:nvPr>
-            <p:ph idx="1"/>
-          </p:nvPr>
-        </p:nvSpPr>
-        <p:spPr/>
-        <p:txBody>
-          <a:bodyPr/>
-          <a:lstStyle/>
-          <a:p>
-            <a:endParaRPr lang="ro-RO" dirty="0" smtClean="0"/>
-          </a:p>
-          <a:p>
-            <a:pPr lvl="0">
-              <a:buClr>
-                <a:srgbClr val="9DBFBE"/>
-              </a:buClr>
-            </a:pPr>
-            <a:r>
-              <a:rPr lang="ro-RO" dirty="0">
-                <a:solidFill>
-                  <a:prstClr val="black">
-                    <a:lumMod val="75000"/>
-                    <a:lumOff val="25000"/>
-                  </a:prstClr>
-                </a:solidFill>
-                <a:latin typeface="Calibri Light" panose="020F0302020204030204"/>
-              </a:rPr>
-              <a:t>Structura bazei de date</a:t>
-            </a:r>
-          </a:p>
-          <a:p>
-            <a:endParaRPr lang="en-US" dirty="0"/>
-          </a:p>
-        </p:txBody>
-      </p:sp>
-    </p:spTree>
-    <p:extLst>
-      <p:ext uri="{BB962C8B-B14F-4D97-AF65-F5344CB8AC3E}">
-        <p14:creationId xmlns:p14="http://schemas.microsoft.com/office/powerpoint/2010/main" val="497791412"/>
-      </p:ext>
-    </p:extLst>
-  </p:cSld>
-  <p:clrMapOvr>
-    <a:masterClrMapping/>
-  </p:clrMapOvr>
-  <p:timing>
-    <p:tnLst>
-      <p:par>
-        <p:cTn id="1" dur="indefinite" restart="never" nodeType="tmRoot"/>
-      </p:par>
-    </p:tnLst>
-  </p:timing>
-</p:sld>
-</file>
-
-<file path=ppt/slides/slide8.xml><?xml version="1.0" encoding="utf-8"?>
-<p:sld xmlns:a="http://schemas.openxmlformats.org/drawingml/2006/main" xmlns:r="http://schemas.openxmlformats.org/officeDocument/2006/relationships" xmlns:p="http://schemas.openxmlformats.org/presentationml/2006/main">
-  <p:cSld>
-    <p:spTree>
-      <p:nvGrpSpPr>
-        <p:cNvPr id="1" name=""/>
-        <p:cNvGrpSpPr/>
-        <p:nvPr/>
-      </p:nvGrpSpPr>
-      <p:grpSpPr>
-        <a:xfrm>
-          <a:off x="0" y="0"/>
-          <a:ext cx="0" cy="0"/>
-          <a:chOff x="0" y="0"/>
-          <a:chExt cx="0" cy="0"/>
-        </a:xfrm>
-      </p:grpSpPr>
-      <p:sp>
-        <p:nvSpPr>
-          <p:cNvPr id="2" name="Title 1"/>
-          <p:cNvSpPr>
-            <a:spLocks noGrp="1"/>
-          </p:cNvSpPr>
-          <p:nvPr>
-            <p:ph type="title"/>
-          </p:nvPr>
-        </p:nvSpPr>
-        <p:spPr/>
-        <p:txBody>
-          <a:bodyPr/>
-          <a:lstStyle/>
-          <a:p>
-            <a:r>
-              <a:rPr lang="ro-RO" dirty="0"/>
-              <a:t>3. Arhitectură</a:t>
-            </a:r>
-            <a:endParaRPr lang="en-US" dirty="0"/>
-          </a:p>
-        </p:txBody>
-      </p:sp>
-      <p:sp>
-        <p:nvSpPr>
-          <p:cNvPr id="3" name="Content Placeholder 2"/>
-          <p:cNvSpPr>
-            <a:spLocks noGrp="1"/>
-          </p:cNvSpPr>
-          <p:nvPr>
-            <p:ph idx="1"/>
-          </p:nvPr>
-        </p:nvSpPr>
-        <p:spPr/>
-        <p:txBody>
-          <a:bodyPr/>
-          <a:lstStyle/>
-          <a:p>
-            <a:endParaRPr lang="ro-RO" dirty="0" smtClean="0"/>
-          </a:p>
-          <a:p>
-            <a:pPr lvl="0">
-              <a:buClr>
-                <a:srgbClr val="9DBFBE"/>
-              </a:buClr>
-            </a:pPr>
-            <a:r>
-              <a:rPr lang="ro-RO" dirty="0">
-                <a:solidFill>
-                  <a:prstClr val="black">
-                    <a:lumMod val="75000"/>
-                    <a:lumOff val="25000"/>
-                  </a:prstClr>
-                </a:solidFill>
-                <a:latin typeface="Calibri Light" panose="020F0302020204030204"/>
-              </a:rPr>
-              <a:t>Structura soluției</a:t>
-            </a:r>
-          </a:p>
-          <a:p>
-            <a:endParaRPr lang="en-US" dirty="0"/>
-          </a:p>
-        </p:txBody>
-      </p:sp>
-    </p:spTree>
-    <p:extLst>
-      <p:ext uri="{BB962C8B-B14F-4D97-AF65-F5344CB8AC3E}">
-        <p14:creationId xmlns:p14="http://schemas.microsoft.com/office/powerpoint/2010/main" val="2108595128"/>
-      </p:ext>
-    </p:extLst>
-  </p:cSld>
-  <p:clrMapOvr>
-    <a:masterClrMapping/>
-  </p:clrMapOvr>
-  <p:timing>
-    <p:tnLst>
-      <p:par>
-        <p:cTn id="1" dur="indefinite" restart="never" nodeType="tmRoot"/>
-      </p:par>
-    </p:tnLst>
-  </p:timing>
-</p:sld>
-</file>
-
-<file path=ppt/slides/slide9.xml><?xml version="1.0" encoding="utf-8"?>
-<p:sld xmlns:a="http://schemas.openxmlformats.org/drawingml/2006/main" xmlns:r="http://schemas.openxmlformats.org/officeDocument/2006/relationships" xmlns:p="http://schemas.openxmlformats.org/presentationml/2006/main">
-  <p:cSld>
-    <p:spTree>
-      <p:nvGrpSpPr>
-        <p:cNvPr id="1" name=""/>
-        <p:cNvGrpSpPr/>
-        <p:nvPr/>
-      </p:nvGrpSpPr>
-      <p:grpSpPr>
-        <a:xfrm>
-          <a:off x="0" y="0"/>
-          <a:ext cx="0" cy="0"/>
-          <a:chOff x="0" y="0"/>
-          <a:chExt cx="0" cy="0"/>
-        </a:xfrm>
-      </p:grpSpPr>
-      <p:sp>
-        <p:nvSpPr>
-          <p:cNvPr id="2" name="Title 1"/>
-          <p:cNvSpPr>
-            <a:spLocks noGrp="1"/>
-          </p:cNvSpPr>
-          <p:nvPr>
-            <p:ph type="title"/>
-          </p:nvPr>
-        </p:nvSpPr>
-        <p:spPr/>
-        <p:txBody>
-          <a:bodyPr/>
-          <a:lstStyle/>
-          <a:p>
-            <a:r>
-              <a:rPr lang="ro-RO" dirty="0" smtClean="0"/>
-              <a:t>4. Direcții viitoare</a:t>
-            </a:r>
-            <a:endParaRPr lang="en-US" dirty="0"/>
-          </a:p>
-        </p:txBody>
-      </p:sp>
-      <p:sp>
-        <p:nvSpPr>
-          <p:cNvPr id="3" name="Content Placeholder 2"/>
-          <p:cNvSpPr>
-            <a:spLocks noGrp="1"/>
-          </p:cNvSpPr>
-          <p:nvPr>
-            <p:ph idx="1"/>
-          </p:nvPr>
-        </p:nvSpPr>
-        <p:spPr/>
-        <p:txBody>
-          <a:bodyPr/>
-          <a:lstStyle/>
-          <a:p>
-            <a:endParaRPr lang="ro-RO" dirty="0" smtClean="0"/>
-          </a:p>
-          <a:p>
-            <a:r>
-              <a:rPr lang="ro-RO" dirty="0" smtClean="0">
-                <a:latin typeface="+mj-lt"/>
-              </a:rPr>
-              <a:t>All kind of upgrades that can be made</a:t>
-            </a:r>
-            <a:endParaRPr lang="en-US" dirty="0">
-              <a:latin typeface="+mj-lt"/>
-            </a:endParaRPr>
-          </a:p>
-        </p:txBody>
-      </p:sp>
-    </p:spTree>
-    <p:extLst>
-      <p:ext uri="{BB962C8B-B14F-4D97-AF65-F5344CB8AC3E}">
-        <p14:creationId xmlns:p14="http://schemas.microsoft.com/office/powerpoint/2010/main" val="3341079738"/>
+        <p14:creationId xmlns:p14="http://schemas.microsoft.com/office/powerpoint/2010/main" val="1915096107"/>
       </p:ext>
     </p:extLst>
   </p:cSld>

</xml_diff>